<commit_message>
change link of anypoint
</commit_message>
<xml_diff>
--- a/001_课程介绍.pptx
+++ b/001_课程介绍.pptx
@@ -210,7 +210,7 @@
           <a:p>
             <a:fld id="{459E4725-02FF-4CC8-80D1-4E6CB5BA833B}" type="datetimeFigureOut">
               <a:rPr lang="zh-CN" altLang="en-US" smtClean="0"/>
-              <a:t>2017/5/27</a:t>
+              <a:t>2017/5/28</a:t>
             </a:fld>
             <a:endParaRPr lang="zh-CN" altLang="en-US"/>
           </a:p>
@@ -2305,7 +2305,7 @@
           <a:p>
             <a:fld id="{DF2CD3D4-64BB-45E1-A891-6EDF440824FE}" type="datetimeFigureOut">
               <a:rPr lang="zh-CN" altLang="en-US" smtClean="0"/>
-              <a:t>2017/5/27</a:t>
+              <a:t>2017/5/28</a:t>
             </a:fld>
             <a:endParaRPr lang="zh-CN" altLang="en-US"/>
           </a:p>
@@ -2473,7 +2473,7 @@
           <a:p>
             <a:fld id="{DF2CD3D4-64BB-45E1-A891-6EDF440824FE}" type="datetimeFigureOut">
               <a:rPr lang="zh-CN" altLang="en-US" smtClean="0"/>
-              <a:t>2017/5/27</a:t>
+              <a:t>2017/5/28</a:t>
             </a:fld>
             <a:endParaRPr lang="zh-CN" altLang="en-US"/>
           </a:p>
@@ -2651,7 +2651,7 @@
           <a:p>
             <a:fld id="{DF2CD3D4-64BB-45E1-A891-6EDF440824FE}" type="datetimeFigureOut">
               <a:rPr lang="zh-CN" altLang="en-US" smtClean="0"/>
-              <a:t>2017/5/27</a:t>
+              <a:t>2017/5/28</a:t>
             </a:fld>
             <a:endParaRPr lang="zh-CN" altLang="en-US"/>
           </a:p>
@@ -2819,7 +2819,7 @@
           <a:p>
             <a:fld id="{DF2CD3D4-64BB-45E1-A891-6EDF440824FE}" type="datetimeFigureOut">
               <a:rPr lang="zh-CN" altLang="en-US" smtClean="0"/>
-              <a:t>2017/5/27</a:t>
+              <a:t>2017/5/28</a:t>
             </a:fld>
             <a:endParaRPr lang="zh-CN" altLang="en-US"/>
           </a:p>
@@ -3064,7 +3064,7 @@
           <a:p>
             <a:fld id="{DF2CD3D4-64BB-45E1-A891-6EDF440824FE}" type="datetimeFigureOut">
               <a:rPr lang="zh-CN" altLang="en-US" smtClean="0"/>
-              <a:t>2017/5/27</a:t>
+              <a:t>2017/5/28</a:t>
             </a:fld>
             <a:endParaRPr lang="zh-CN" altLang="en-US"/>
           </a:p>
@@ -3293,7 +3293,7 @@
           <a:p>
             <a:fld id="{DF2CD3D4-64BB-45E1-A891-6EDF440824FE}" type="datetimeFigureOut">
               <a:rPr lang="zh-CN" altLang="en-US" smtClean="0"/>
-              <a:t>2017/5/27</a:t>
+              <a:t>2017/5/28</a:t>
             </a:fld>
             <a:endParaRPr lang="zh-CN" altLang="en-US"/>
           </a:p>
@@ -3657,7 +3657,7 @@
           <a:p>
             <a:fld id="{DF2CD3D4-64BB-45E1-A891-6EDF440824FE}" type="datetimeFigureOut">
               <a:rPr lang="zh-CN" altLang="en-US" smtClean="0"/>
-              <a:t>2017/5/27</a:t>
+              <a:t>2017/5/28</a:t>
             </a:fld>
             <a:endParaRPr lang="zh-CN" altLang="en-US"/>
           </a:p>
@@ -3774,7 +3774,7 @@
           <a:p>
             <a:fld id="{DF2CD3D4-64BB-45E1-A891-6EDF440824FE}" type="datetimeFigureOut">
               <a:rPr lang="zh-CN" altLang="en-US" smtClean="0"/>
-              <a:t>2017/5/27</a:t>
+              <a:t>2017/5/28</a:t>
             </a:fld>
             <a:endParaRPr lang="zh-CN" altLang="en-US"/>
           </a:p>
@@ -3869,7 +3869,7 @@
           <a:p>
             <a:fld id="{DF2CD3D4-64BB-45E1-A891-6EDF440824FE}" type="datetimeFigureOut">
               <a:rPr lang="zh-CN" altLang="en-US" smtClean="0"/>
-              <a:t>2017/5/27</a:t>
+              <a:t>2017/5/28</a:t>
             </a:fld>
             <a:endParaRPr lang="zh-CN" altLang="en-US"/>
           </a:p>
@@ -4144,7 +4144,7 @@
           <a:p>
             <a:fld id="{DF2CD3D4-64BB-45E1-A891-6EDF440824FE}" type="datetimeFigureOut">
               <a:rPr lang="zh-CN" altLang="en-US" smtClean="0"/>
-              <a:t>2017/5/27</a:t>
+              <a:t>2017/5/28</a:t>
             </a:fld>
             <a:endParaRPr lang="zh-CN" altLang="en-US"/>
           </a:p>
@@ -4396,7 +4396,7 @@
           <a:p>
             <a:fld id="{DF2CD3D4-64BB-45E1-A891-6EDF440824FE}" type="datetimeFigureOut">
               <a:rPr lang="zh-CN" altLang="en-US" smtClean="0"/>
-              <a:t>2017/5/27</a:t>
+              <a:t>2017/5/28</a:t>
             </a:fld>
             <a:endParaRPr lang="zh-CN" altLang="en-US"/>
           </a:p>
@@ -4607,7 +4607,7 @@
           <a:p>
             <a:fld id="{DF2CD3D4-64BB-45E1-A891-6EDF440824FE}" type="datetimeFigureOut">
               <a:rPr lang="zh-CN" altLang="en-US" smtClean="0"/>
-              <a:t>2017/5/27</a:t>
+              <a:t>2017/5/28</a:t>
             </a:fld>
             <a:endParaRPr lang="zh-CN" altLang="en-US"/>
           </a:p>
@@ -5967,7 +5967,7 @@
             </a:ln>
             <a:extLst>
               <a:ext uri="{91240B29-F687-4f45-9708-019B960494DF}">
-                <a14:hiddenLine xmlns:a14="http://schemas.microsoft.com/office/drawing/2010/main" xmlns="" w="9525">
+                <a14:hiddenLine xmlns="" xmlns:a14="http://schemas.microsoft.com/office/drawing/2010/main" w="9525">
                   <a:solidFill>
                     <a:srgbClr val="000000"/>
                   </a:solidFill>
@@ -6205,7 +6205,7 @@
             </a:ln>
             <a:extLst>
               <a:ext uri="{91240B29-F687-4f45-9708-019B960494DF}">
-                <a14:hiddenLine xmlns:a14="http://schemas.microsoft.com/office/drawing/2010/main" xmlns="" w="9525">
+                <a14:hiddenLine xmlns="" xmlns:a14="http://schemas.microsoft.com/office/drawing/2010/main" w="9525">
                   <a:solidFill>
                     <a:srgbClr val="000000"/>
                   </a:solidFill>
@@ -6365,7 +6365,7 @@
             </a:ln>
             <a:extLst>
               <a:ext uri="{91240B29-F687-4f45-9708-019B960494DF}">
-                <a14:hiddenLine xmlns:a14="http://schemas.microsoft.com/office/drawing/2010/main" xmlns="" w="9525">
+                <a14:hiddenLine xmlns="" xmlns:a14="http://schemas.microsoft.com/office/drawing/2010/main" w="9525">
                   <a:solidFill>
                     <a:srgbClr val="000000"/>
                   </a:solidFill>
@@ -6492,7 +6492,7 @@
             </a:ln>
             <a:extLst>
               <a:ext uri="{91240B29-F687-4f45-9708-019B960494DF}">
-                <a14:hiddenLine xmlns:a14="http://schemas.microsoft.com/office/drawing/2010/main" xmlns="" w="9525">
+                <a14:hiddenLine xmlns="" xmlns:a14="http://schemas.microsoft.com/office/drawing/2010/main" w="9525">
                   <a:solidFill>
                     <a:srgbClr val="000000"/>
                   </a:solidFill>
@@ -6683,7 +6683,7 @@
             </a:ln>
             <a:extLst>
               <a:ext uri="{91240B29-F687-4f45-9708-019B960494DF}">
-                <a14:hiddenLine xmlns:a14="http://schemas.microsoft.com/office/drawing/2010/main" xmlns="" w="9525">
+                <a14:hiddenLine xmlns="" xmlns:a14="http://schemas.microsoft.com/office/drawing/2010/main" w="9525">
                   <a:solidFill>
                     <a:srgbClr val="000000"/>
                   </a:solidFill>
@@ -6810,7 +6810,7 @@
             </a:ln>
             <a:extLst>
               <a:ext uri="{91240B29-F687-4f45-9708-019B960494DF}">
-                <a14:hiddenLine xmlns:a14="http://schemas.microsoft.com/office/drawing/2010/main" xmlns="" w="9525">
+                <a14:hiddenLine xmlns="" xmlns:a14="http://schemas.microsoft.com/office/drawing/2010/main" w="9525">
                   <a:solidFill>
                     <a:srgbClr val="000000"/>
                   </a:solidFill>
@@ -7683,7 +7683,7 @@
             </a:ln>
             <a:extLst>
               <a:ext uri="{91240B29-F687-4f45-9708-019B960494DF}">
-                <a14:hiddenLine xmlns:a14="http://schemas.microsoft.com/office/drawing/2010/main" xmlns="" w="9525">
+                <a14:hiddenLine xmlns="" xmlns:a14="http://schemas.microsoft.com/office/drawing/2010/main" w="9525">
                   <a:solidFill>
                     <a:srgbClr val="000000"/>
                   </a:solidFill>
@@ -7843,7 +7843,7 @@
             </a:ln>
             <a:extLst>
               <a:ext uri="{91240B29-F687-4f45-9708-019B960494DF}">
-                <a14:hiddenLine xmlns:a14="http://schemas.microsoft.com/office/drawing/2010/main" xmlns="" w="9525">
+                <a14:hiddenLine xmlns="" xmlns:a14="http://schemas.microsoft.com/office/drawing/2010/main" w="9525">
                   <a:solidFill>
                     <a:srgbClr val="000000"/>
                   </a:solidFill>
@@ -8021,7 +8021,7 @@
             </a:ln>
             <a:extLst>
               <a:ext uri="{91240B29-F687-4f45-9708-019B960494DF}">
-                <a14:hiddenLine xmlns:a14="http://schemas.microsoft.com/office/drawing/2010/main" xmlns="" w="9525">
+                <a14:hiddenLine xmlns="" xmlns:a14="http://schemas.microsoft.com/office/drawing/2010/main" w="9525">
                   <a:solidFill>
                     <a:srgbClr val="000000"/>
                   </a:solidFill>
@@ -8091,7 +8091,7 @@
             </a:ln>
             <a:extLst>
               <a:ext uri="{91240B29-F687-4f45-9708-019B960494DF}">
-                <a14:hiddenLine xmlns:a14="http://schemas.microsoft.com/office/drawing/2010/main" xmlns="" w="9525">
+                <a14:hiddenLine xmlns="" xmlns:a14="http://schemas.microsoft.com/office/drawing/2010/main" w="9525">
                   <a:solidFill>
                     <a:srgbClr val="000000"/>
                   </a:solidFill>
@@ -8143,7 +8143,7 @@
             </a:ln>
             <a:extLst>
               <a:ext uri="{91240B29-F687-4f45-9708-019B960494DF}">
-                <a14:hiddenLine xmlns:a14="http://schemas.microsoft.com/office/drawing/2010/main" xmlns="" w="9525">
+                <a14:hiddenLine xmlns="" xmlns:a14="http://schemas.microsoft.com/office/drawing/2010/main" w="9525">
                   <a:solidFill>
                     <a:srgbClr val="000000"/>
                   </a:solidFill>
@@ -8195,7 +8195,7 @@
             </a:ln>
             <a:extLst>
               <a:ext uri="{91240B29-F687-4f45-9708-019B960494DF}">
-                <a14:hiddenLine xmlns:a14="http://schemas.microsoft.com/office/drawing/2010/main" xmlns="" w="9525">
+                <a14:hiddenLine xmlns="" xmlns:a14="http://schemas.microsoft.com/office/drawing/2010/main" w="9525">
                   <a:solidFill>
                     <a:srgbClr val="000000"/>
                   </a:solidFill>
@@ -8446,7 +8446,7 @@
             </a:ln>
             <a:extLst>
               <a:ext uri="{91240B29-F687-4f45-9708-019B960494DF}">
-                <a14:hiddenLine xmlns:a14="http://schemas.microsoft.com/office/drawing/2010/main" xmlns="" w="9525">
+                <a14:hiddenLine xmlns="" xmlns:a14="http://schemas.microsoft.com/office/drawing/2010/main" w="9525">
                   <a:solidFill>
                     <a:srgbClr val="000000"/>
                   </a:solidFill>
@@ -8697,7 +8697,7 @@
             </a:ln>
             <a:extLst>
               <a:ext uri="{91240B29-F687-4f45-9708-019B960494DF}">
-                <a14:hiddenLine xmlns:a14="http://schemas.microsoft.com/office/drawing/2010/main" xmlns="" w="9525">
+                <a14:hiddenLine xmlns="" xmlns:a14="http://schemas.microsoft.com/office/drawing/2010/main" w="9525">
                   <a:solidFill>
                     <a:srgbClr val="000000"/>
                   </a:solidFill>
@@ -8985,7 +8985,7 @@
             </a:ln>
             <a:extLst>
               <a:ext uri="{91240B29-F687-4f45-9708-019B960494DF}">
-                <a14:hiddenLine xmlns:a14="http://schemas.microsoft.com/office/drawing/2010/main" xmlns="" w="9525">
+                <a14:hiddenLine xmlns="" xmlns:a14="http://schemas.microsoft.com/office/drawing/2010/main" w="9525">
                   <a:solidFill>
                     <a:srgbClr val="000000"/>
                   </a:solidFill>
@@ -13818,20 +13818,7 @@
                 <a:ea typeface="Open Sans Light" panose="020B0306030504020204" pitchFamily="34" charset="0"/>
                 <a:cs typeface="Calibri Light"/>
               </a:rPr>
-              <a:t>——</a:t>
-            </a:r>
-            <a:r>
-              <a:rPr lang="en-US" altLang="zh-CN" sz="2000" b="1" dirty="0">
-                <a:solidFill>
-                  <a:schemeClr val="bg2">
-                    <a:lumMod val="25000"/>
-                  </a:schemeClr>
-                </a:solidFill>
-                <a:latin typeface="Calibri Light"/>
-                <a:ea typeface="Open Sans Light" panose="020B0306030504020204" pitchFamily="34" charset="0"/>
-                <a:cs typeface="Calibri Light"/>
-              </a:rPr>
-              <a:t>Wikipedia</a:t>
+              <a:t>——Wikipedia</a:t>
             </a:r>
             <a:endParaRPr lang="en-US" sz="2000" b="1" dirty="0">
               <a:solidFill>
@@ -14359,20 +14346,7 @@
                 <a:ea typeface="Open Sans Light" panose="020B0306030504020204" pitchFamily="34" charset="0"/>
                 <a:cs typeface="Calibri Light"/>
               </a:rPr>
-              <a:t>——</a:t>
-            </a:r>
-            <a:r>
-              <a:rPr lang="en-US" altLang="zh-CN" sz="2000" b="1" dirty="0">
-                <a:solidFill>
-                  <a:schemeClr val="bg2">
-                    <a:lumMod val="25000"/>
-                  </a:schemeClr>
-                </a:solidFill>
-                <a:latin typeface="Calibri Light"/>
-                <a:ea typeface="Open Sans Light" panose="020B0306030504020204" pitchFamily="34" charset="0"/>
-                <a:cs typeface="Calibri Light"/>
-              </a:rPr>
-              <a:t>MuleSoft.com</a:t>
+              <a:t>——MuleSoft.com</a:t>
             </a:r>
             <a:endParaRPr lang="en-US" sz="2000" b="1" dirty="0">
               <a:solidFill>
@@ -19125,7 +19099,63 @@
                 <a:cs typeface="Calibri Light"/>
                 <a:hlinkClick r:id="rId5"/>
               </a:rPr>
-              <a:t>https://www.getpostman.com/</a:t>
+              <a:t>https://</a:t>
+            </a:r>
+            <a:r>
+              <a:rPr lang="en-US" sz="1400" smtClean="0">
+                <a:solidFill>
+                  <a:schemeClr val="bg2">
+                    <a:lumMod val="25000"/>
+                  </a:schemeClr>
+                </a:solidFill>
+                <a:latin typeface="Calibri Light"/>
+                <a:ea typeface="Open Sans Light" panose="020B0306030504020204" pitchFamily="34" charset="0"/>
+                <a:cs typeface="Calibri Light"/>
+                <a:hlinkClick r:id="rId5"/>
+              </a:rPr>
+              <a:t>www.</a:t>
+            </a:r>
+            <a:r>
+              <a:rPr lang="en-US" altLang="zh-CN" sz="1400" smtClean="0">
+                <a:solidFill>
+                  <a:schemeClr val="bg2">
+                    <a:lumMod val="25000"/>
+                  </a:schemeClr>
+                </a:solidFill>
+                <a:latin typeface="Calibri Light"/>
+                <a:ea typeface="Open Sans Light" panose="020B0306030504020204" pitchFamily="34" charset="0"/>
+                <a:cs typeface="Calibri Light"/>
+                <a:hlinkClick r:id="rId5"/>
+              </a:rPr>
+              <a:t>anypoint.mulesoft</a:t>
+            </a:r>
+            <a:r>
+              <a:rPr lang="en-US" sz="1400" smtClean="0">
+                <a:solidFill>
+                  <a:schemeClr val="bg2">
+                    <a:lumMod val="25000"/>
+                  </a:schemeClr>
+                </a:solidFill>
+                <a:latin typeface="Calibri Light"/>
+                <a:ea typeface="Open Sans Light" panose="020B0306030504020204" pitchFamily="34" charset="0"/>
+                <a:cs typeface="Calibri Light"/>
+                <a:hlinkClick r:id="rId5"/>
+              </a:rPr>
+              <a:t>.com</a:t>
+            </a:r>
+            <a:r>
+              <a:rPr lang="en-US" sz="1400" dirty="0">
+                <a:solidFill>
+                  <a:schemeClr val="bg2">
+                    <a:lumMod val="25000"/>
+                  </a:schemeClr>
+                </a:solidFill>
+                <a:latin typeface="Calibri Light"/>
+                <a:ea typeface="Open Sans Light" panose="020B0306030504020204" pitchFamily="34" charset="0"/>
+                <a:cs typeface="Calibri Light"/>
+                <a:hlinkClick r:id="rId5"/>
+              </a:rPr>
+              <a:t>/</a:t>
             </a:r>
             <a:endParaRPr lang="en-US" sz="1400" dirty="0">
               <a:solidFill>

</xml_diff>